<commit_message>
team and the workforce added to slidedeck
</commit_message>
<xml_diff>
--- a/static/images/pitch.pptx
+++ b/static/images/pitch.pptx
@@ -7,22 +7,23 @@
   <p:sldIdLst>
     <p:sldId id="271" r:id="rId2"/>
     <p:sldId id="272" r:id="rId3"/>
-    <p:sldId id="274" r:id="rId4"/>
-    <p:sldId id="273" r:id="rId5"/>
-    <p:sldId id="256" r:id="rId6"/>
-    <p:sldId id="259" r:id="rId7"/>
-    <p:sldId id="269" r:id="rId8"/>
-    <p:sldId id="270" r:id="rId9"/>
-    <p:sldId id="264" r:id="rId10"/>
-    <p:sldId id="267" r:id="rId11"/>
-    <p:sldId id="266" r:id="rId12"/>
-    <p:sldId id="257" r:id="rId13"/>
-    <p:sldId id="261" r:id="rId14"/>
-    <p:sldId id="260" r:id="rId15"/>
-    <p:sldId id="262" r:id="rId16"/>
-    <p:sldId id="265" r:id="rId17"/>
-    <p:sldId id="258" r:id="rId18"/>
-    <p:sldId id="263" r:id="rId19"/>
+    <p:sldId id="275" r:id="rId4"/>
+    <p:sldId id="274" r:id="rId5"/>
+    <p:sldId id="273" r:id="rId6"/>
+    <p:sldId id="256" r:id="rId7"/>
+    <p:sldId id="259" r:id="rId8"/>
+    <p:sldId id="269" r:id="rId9"/>
+    <p:sldId id="270" r:id="rId10"/>
+    <p:sldId id="264" r:id="rId11"/>
+    <p:sldId id="267" r:id="rId12"/>
+    <p:sldId id="266" r:id="rId13"/>
+    <p:sldId id="257" r:id="rId14"/>
+    <p:sldId id="261" r:id="rId15"/>
+    <p:sldId id="260" r:id="rId16"/>
+    <p:sldId id="262" r:id="rId17"/>
+    <p:sldId id="265" r:id="rId18"/>
+    <p:sldId id="258" r:id="rId19"/>
+    <p:sldId id="263" r:id="rId20"/>
   </p:sldIdLst>
   <p:sldSz cx="12192000" cy="6858000"/>
   <p:notesSz cx="6858000" cy="9144000"/>
@@ -129,7 +130,7 @@
   <pc:docChgLst>
     <pc:chgData name="McGuire, William" userId="b57b71b3-2582-4369-b5c7-eb94d03fb1e7" providerId="ADAL" clId="{5E73F4D4-0C21-43A7-943D-72FAC8EA5892}"/>
     <pc:docChg chg="undo custSel addSld delSld modSld sldOrd modMainMaster">
-      <pc:chgData name="McGuire, William" userId="b57b71b3-2582-4369-b5c7-eb94d03fb1e7" providerId="ADAL" clId="{5E73F4D4-0C21-43A7-943D-72FAC8EA5892}" dt="2018-02-18T07:21:53.366" v="7155" actId="1035"/>
+      <pc:chgData name="McGuire, William" userId="b57b71b3-2582-4369-b5c7-eb94d03fb1e7" providerId="ADAL" clId="{5E73F4D4-0C21-43A7-943D-72FAC8EA5892}" dt="2018-02-18T08:00:36.397" v="9099" actId="1076"/>
       <pc:docMkLst>
         <pc:docMk/>
       </pc:docMkLst>
@@ -1980,7 +1981,7 @@
         </pc:spChg>
       </pc:sldChg>
       <pc:sldChg chg="addSp delSp modSp add">
-        <pc:chgData name="McGuire, William" userId="b57b71b3-2582-4369-b5c7-eb94d03fb1e7" providerId="ADAL" clId="{5E73F4D4-0C21-43A7-943D-72FAC8EA5892}" dt="2018-02-18T07:17:42.375" v="6909" actId="20577"/>
+        <pc:chgData name="McGuire, William" userId="b57b71b3-2582-4369-b5c7-eb94d03fb1e7" providerId="ADAL" clId="{5E73F4D4-0C21-43A7-943D-72FAC8EA5892}" dt="2018-02-18T08:00:36.397" v="9099" actId="1076"/>
         <pc:sldMkLst>
           <pc:docMk/>
           <pc:sldMk cId="2356741573" sldId="274"/>
@@ -2002,11 +2003,35 @@
           </ac:spMkLst>
         </pc:spChg>
         <pc:spChg chg="add mod">
-          <ac:chgData name="McGuire, William" userId="b57b71b3-2582-4369-b5c7-eb94d03fb1e7" providerId="ADAL" clId="{5E73F4D4-0C21-43A7-943D-72FAC8EA5892}" dt="2018-02-18T07:17:42.375" v="6909" actId="20577"/>
+          <ac:chgData name="McGuire, William" userId="b57b71b3-2582-4369-b5c7-eb94d03fb1e7" providerId="ADAL" clId="{5E73F4D4-0C21-43A7-943D-72FAC8EA5892}" dt="2018-02-18T08:00:17.858" v="9092" actId="1036"/>
           <ac:spMkLst>
             <pc:docMk/>
             <pc:sldMk cId="2356741573" sldId="274"/>
             <ac:spMk id="21" creationId="{754783BB-DF18-4496-BFA8-F59165A25799}"/>
+          </ac:spMkLst>
+        </pc:spChg>
+        <pc:spChg chg="add mod">
+          <ac:chgData name="McGuire, William" userId="b57b71b3-2582-4369-b5c7-eb94d03fb1e7" providerId="ADAL" clId="{5E73F4D4-0C21-43A7-943D-72FAC8EA5892}" dt="2018-02-18T08:00:17.858" v="9092" actId="1036"/>
+          <ac:spMkLst>
+            <pc:docMk/>
+            <pc:sldMk cId="2356741573" sldId="274"/>
+            <ac:spMk id="22" creationId="{84B49664-D256-4706-943E-2FDDECDFAB4C}"/>
+          </ac:spMkLst>
+        </pc:spChg>
+        <pc:spChg chg="add mod">
+          <ac:chgData name="McGuire, William" userId="b57b71b3-2582-4369-b5c7-eb94d03fb1e7" providerId="ADAL" clId="{5E73F4D4-0C21-43A7-943D-72FAC8EA5892}" dt="2018-02-18T08:00:17.858" v="9092" actId="1036"/>
+          <ac:spMkLst>
+            <pc:docMk/>
+            <pc:sldMk cId="2356741573" sldId="274"/>
+            <ac:spMk id="24" creationId="{04A42B12-12C3-498D-94EE-45B619ABD773}"/>
+          </ac:spMkLst>
+        </pc:spChg>
+        <pc:spChg chg="add del mod">
+          <ac:chgData name="McGuire, William" userId="b57b71b3-2582-4369-b5c7-eb94d03fb1e7" providerId="ADAL" clId="{5E73F4D4-0C21-43A7-943D-72FAC8EA5892}" dt="2018-02-18T07:38:38.331" v="7954" actId="478"/>
+          <ac:spMkLst>
+            <pc:docMk/>
+            <pc:sldMk cId="2356741573" sldId="274"/>
+            <ac:spMk id="25" creationId="{0909E16D-DBED-433D-A771-DF651DE4E434}"/>
           </ac:spMkLst>
         </pc:spChg>
         <pc:spChg chg="del">
@@ -2026,7 +2051,7 @@
           </ac:spMkLst>
         </pc:spChg>
         <pc:spChg chg="mod">
-          <ac:chgData name="McGuire, William" userId="b57b71b3-2582-4369-b5c7-eb94d03fb1e7" providerId="ADAL" clId="{5E73F4D4-0C21-43A7-943D-72FAC8EA5892}" dt="2018-02-18T07:07:42.888" v="6385" actId="1076"/>
+          <ac:chgData name="McGuire, William" userId="b57b71b3-2582-4369-b5c7-eb94d03fb1e7" providerId="ADAL" clId="{5E73F4D4-0C21-43A7-943D-72FAC8EA5892}" dt="2018-02-18T07:38:35.361" v="7953" actId="20577"/>
           <ac:spMkLst>
             <pc:docMk/>
             <pc:sldMk cId="2356741573" sldId="274"/>
@@ -2034,7 +2059,7 @@
           </ac:spMkLst>
         </pc:spChg>
         <pc:spChg chg="mod">
-          <ac:chgData name="McGuire, William" userId="b57b71b3-2582-4369-b5c7-eb94d03fb1e7" providerId="ADAL" clId="{5E73F4D4-0C21-43A7-943D-72FAC8EA5892}" dt="2018-02-18T07:07:33.152" v="6382" actId="1076"/>
+          <ac:chgData name="McGuire, William" userId="b57b71b3-2582-4369-b5c7-eb94d03fb1e7" providerId="ADAL" clId="{5E73F4D4-0C21-43A7-943D-72FAC8EA5892}" dt="2018-02-18T07:38:05.519" v="7922" actId="1076"/>
           <ac:spMkLst>
             <pc:docMk/>
             <pc:sldMk cId="2356741573" sldId="274"/>
@@ -2049,22 +2074,37 @@
             <ac:picMk id="2" creationId="{4EDE73EA-389C-4C7A-BEDB-ED8466518129}"/>
           </ac:picMkLst>
         </pc:picChg>
-        <pc:picChg chg="add mod">
-          <ac:chgData name="McGuire, William" userId="b57b71b3-2582-4369-b5c7-eb94d03fb1e7" providerId="ADAL" clId="{5E73F4D4-0C21-43A7-943D-72FAC8EA5892}" dt="2018-02-18T07:08:42.865" v="6397" actId="14100"/>
+        <pc:picChg chg="add del mod">
+          <ac:chgData name="McGuire, William" userId="b57b71b3-2582-4369-b5c7-eb94d03fb1e7" providerId="ADAL" clId="{5E73F4D4-0C21-43A7-943D-72FAC8EA5892}" dt="2018-02-18T07:39:26.726" v="7956" actId="478"/>
           <ac:picMkLst>
             <pc:docMk/>
             <pc:sldMk cId="2356741573" sldId="274"/>
             <ac:picMk id="4" creationId="{79F67352-0FEF-4255-9965-CF500C1EBC99}"/>
           </ac:picMkLst>
         </pc:picChg>
-        <pc:picChg chg="add mod">
-          <ac:chgData name="McGuire, William" userId="b57b71b3-2582-4369-b5c7-eb94d03fb1e7" providerId="ADAL" clId="{5E73F4D4-0C21-43A7-943D-72FAC8EA5892}" dt="2018-02-18T07:09:40.137" v="6398" actId="1076"/>
+        <pc:picChg chg="add del mod">
+          <ac:chgData name="McGuire, William" userId="b57b71b3-2582-4369-b5c7-eb94d03fb1e7" providerId="ADAL" clId="{5E73F4D4-0C21-43A7-943D-72FAC8EA5892}" dt="2018-02-18T07:39:26.726" v="7956" actId="478"/>
           <ac:picMkLst>
             <pc:docMk/>
             <pc:sldMk cId="2356741573" sldId="274"/>
             <ac:picMk id="6" creationId="{A53F6A6A-F2DF-4527-BF6A-81D24BF44458}"/>
           </ac:picMkLst>
         </pc:picChg>
+        <pc:picChg chg="add mod modCrop">
+          <ac:chgData name="McGuire, William" userId="b57b71b3-2582-4369-b5c7-eb94d03fb1e7" providerId="ADAL" clId="{5E73F4D4-0C21-43A7-943D-72FAC8EA5892}" dt="2018-02-18T08:00:36.397" v="9099" actId="1076"/>
+          <ac:picMkLst>
+            <pc:docMk/>
+            <pc:sldMk cId="2356741573" sldId="274"/>
+            <ac:picMk id="8" creationId="{EA5002B3-F8AC-4FD8-B43B-D27F2BAA618A}"/>
+          </ac:picMkLst>
+        </pc:picChg>
+      </pc:sldChg>
+      <pc:sldChg chg="add ord">
+        <pc:chgData name="McGuire, William" userId="b57b71b3-2582-4369-b5c7-eb94d03fb1e7" providerId="ADAL" clId="{5E73F4D4-0C21-43A7-943D-72FAC8EA5892}" dt="2018-02-18T07:39:20.458" v="7955"/>
+        <pc:sldMkLst>
+          <pc:docMk/>
+          <pc:sldMk cId="44050594" sldId="275"/>
+        </pc:sldMkLst>
       </pc:sldChg>
       <pc:sldMasterChg chg="setBg">
         <pc:chgData name="McGuire, William" userId="b57b71b3-2582-4369-b5c7-eb94d03fb1e7" providerId="ADAL" clId="{5E73F4D4-0C21-43A7-943D-72FAC8EA5892}" dt="2018-02-17T17:10:35.838" v="1882"/>
@@ -9758,6 +9798,425 @@
       </p:sp>
       <p:sp>
         <p:nvSpPr>
+          <p:cNvPr id="20" name="TextBox 19">
+            <a:extLst>
+              <a:ext uri="{FF2B5EF4-FFF2-40B4-BE49-F238E27FC236}">
+                <a16:creationId xmlns:a16="http://schemas.microsoft.com/office/drawing/2014/main" id="{39D87466-FB96-4AED-815C-3907B2687689}"/>
+              </a:ext>
+            </a:extLst>
+          </p:cNvPr>
+          <p:cNvSpPr txBox="1"/>
+          <p:nvPr/>
+        </p:nvSpPr>
+        <p:spPr>
+          <a:xfrm>
+            <a:off x="3683000" y="652979"/>
+            <a:ext cx="4445000" cy="861774"/>
+          </a:xfrm>
+          <a:prstGeom prst="rect">
+            <a:avLst/>
+          </a:prstGeom>
+          <a:noFill/>
+        </p:spPr>
+        <p:txBody>
+          <a:bodyPr wrap="square" rtlCol="0">
+            <a:spAutoFit/>
+          </a:bodyPr>
+          <a:lstStyle/>
+          <a:p>
+            <a:pPr algn="ctr"/>
+            <a:r>
+              <a:rPr lang="en-US" sz="5000" dirty="0"/>
+              <a:t>Location</a:t>
+            </a:r>
+          </a:p>
+        </p:txBody>
+      </p:sp>
+      <p:sp>
+        <p:nvSpPr>
+          <p:cNvPr id="4" name="Rectangle 3">
+            <a:extLst>
+              <a:ext uri="{FF2B5EF4-FFF2-40B4-BE49-F238E27FC236}">
+                <a16:creationId xmlns:a16="http://schemas.microsoft.com/office/drawing/2014/main" id="{3C31707E-6B24-485B-97E0-A0CAFED2FBB5}"/>
+              </a:ext>
+            </a:extLst>
+          </p:cNvPr>
+          <p:cNvSpPr/>
+          <p:nvPr/>
+        </p:nvSpPr>
+        <p:spPr>
+          <a:xfrm>
+            <a:off x="2600960" y="1859280"/>
+            <a:ext cx="1544320" cy="1066800"/>
+          </a:xfrm>
+          <a:prstGeom prst="rect">
+            <a:avLst/>
+          </a:prstGeom>
+        </p:spPr>
+        <p:style>
+          <a:lnRef idx="2">
+            <a:schemeClr val="accent1">
+              <a:shade val="50000"/>
+            </a:schemeClr>
+          </a:lnRef>
+          <a:fillRef idx="1">
+            <a:schemeClr val="accent1"/>
+          </a:fillRef>
+          <a:effectRef idx="0">
+            <a:schemeClr val="accent1"/>
+          </a:effectRef>
+          <a:fontRef idx="minor">
+            <a:schemeClr val="lt1"/>
+          </a:fontRef>
+        </p:style>
+        <p:txBody>
+          <a:bodyPr rtlCol="0" anchor="ctr"/>
+          <a:lstStyle/>
+          <a:p>
+            <a:pPr algn="ctr"/>
+            <a:endParaRPr lang="en-US"/>
+          </a:p>
+        </p:txBody>
+      </p:sp>
+      <p:sp>
+        <p:nvSpPr>
+          <p:cNvPr id="21" name="Rectangle 20">
+            <a:extLst>
+              <a:ext uri="{FF2B5EF4-FFF2-40B4-BE49-F238E27FC236}">
+                <a16:creationId xmlns:a16="http://schemas.microsoft.com/office/drawing/2014/main" id="{635E40C5-90CD-48DE-A020-B99BDCB3666A}"/>
+              </a:ext>
+            </a:extLst>
+          </p:cNvPr>
+          <p:cNvSpPr/>
+          <p:nvPr/>
+        </p:nvSpPr>
+        <p:spPr>
+          <a:xfrm>
+            <a:off x="5405120" y="2032000"/>
+            <a:ext cx="1544320" cy="1066800"/>
+          </a:xfrm>
+          <a:prstGeom prst="rect">
+            <a:avLst/>
+          </a:prstGeom>
+        </p:spPr>
+        <p:style>
+          <a:lnRef idx="2">
+            <a:schemeClr val="accent1">
+              <a:shade val="50000"/>
+            </a:schemeClr>
+          </a:lnRef>
+          <a:fillRef idx="1">
+            <a:schemeClr val="accent1"/>
+          </a:fillRef>
+          <a:effectRef idx="0">
+            <a:schemeClr val="accent1"/>
+          </a:effectRef>
+          <a:fontRef idx="minor">
+            <a:schemeClr val="lt1"/>
+          </a:fontRef>
+        </p:style>
+        <p:txBody>
+          <a:bodyPr rtlCol="0" anchor="ctr"/>
+          <a:lstStyle/>
+          <a:p>
+            <a:pPr algn="ctr"/>
+            <a:endParaRPr lang="en-US"/>
+          </a:p>
+        </p:txBody>
+      </p:sp>
+      <p:sp>
+        <p:nvSpPr>
+          <p:cNvPr id="22" name="Rectangle 21">
+            <a:extLst>
+              <a:ext uri="{FF2B5EF4-FFF2-40B4-BE49-F238E27FC236}">
+                <a16:creationId xmlns:a16="http://schemas.microsoft.com/office/drawing/2014/main" id="{5DEFFF57-B896-4283-972A-C4A5830F65C0}"/>
+              </a:ext>
+            </a:extLst>
+          </p:cNvPr>
+          <p:cNvSpPr/>
+          <p:nvPr/>
+        </p:nvSpPr>
+        <p:spPr>
+          <a:xfrm>
+            <a:off x="7945120" y="1711960"/>
+            <a:ext cx="1544320" cy="1066800"/>
+          </a:xfrm>
+          <a:prstGeom prst="rect">
+            <a:avLst/>
+          </a:prstGeom>
+        </p:spPr>
+        <p:style>
+          <a:lnRef idx="2">
+            <a:schemeClr val="accent1">
+              <a:shade val="50000"/>
+            </a:schemeClr>
+          </a:lnRef>
+          <a:fillRef idx="1">
+            <a:schemeClr val="accent1"/>
+          </a:fillRef>
+          <a:effectRef idx="0">
+            <a:schemeClr val="accent1"/>
+          </a:effectRef>
+          <a:fontRef idx="minor">
+            <a:schemeClr val="lt1"/>
+          </a:fontRef>
+        </p:style>
+        <p:txBody>
+          <a:bodyPr rtlCol="0" anchor="ctr"/>
+          <a:lstStyle/>
+          <a:p>
+            <a:pPr algn="ctr"/>
+            <a:endParaRPr lang="en-US"/>
+          </a:p>
+        </p:txBody>
+      </p:sp>
+    </p:spTree>
+    <p:extLst>
+      <p:ext uri="{BB962C8B-B14F-4D97-AF65-F5344CB8AC3E}">
+        <p14:creationId xmlns:p14="http://schemas.microsoft.com/office/powerpoint/2010/main" val="3135721834"/>
+      </p:ext>
+    </p:extLst>
+  </p:cSld>
+  <p:clrMapOvr>
+    <a:masterClrMapping/>
+  </p:clrMapOvr>
+</p:sld>
+</file>
+
+<file path=ppt/slides/slide11.xml><?xml version="1.0" encoding="utf-8"?>
+<p:sld xmlns:a="http://schemas.openxmlformats.org/drawingml/2006/main" xmlns:r="http://schemas.openxmlformats.org/officeDocument/2006/relationships" xmlns:p="http://schemas.openxmlformats.org/presentationml/2006/main">
+  <p:cSld>
+    <p:spTree>
+      <p:nvGrpSpPr>
+        <p:cNvPr id="1" name=""/>
+        <p:cNvGrpSpPr/>
+        <p:nvPr/>
+      </p:nvGrpSpPr>
+      <p:grpSpPr>
+        <a:xfrm>
+          <a:off x="0" y="0"/>
+          <a:ext cx="0" cy="0"/>
+          <a:chOff x="0" y="0"/>
+          <a:chExt cx="0" cy="0"/>
+        </a:xfrm>
+      </p:grpSpPr>
+      <p:sp>
+        <p:nvSpPr>
+          <p:cNvPr id="6" name="Rectangle 5">
+            <a:extLst>
+              <a:ext uri="{FF2B5EF4-FFF2-40B4-BE49-F238E27FC236}">
+                <a16:creationId xmlns:a16="http://schemas.microsoft.com/office/drawing/2014/main" id="{BE21B872-4817-42CC-AC91-C88120918379}"/>
+              </a:ext>
+            </a:extLst>
+          </p:cNvPr>
+          <p:cNvSpPr/>
+          <p:nvPr/>
+        </p:nvSpPr>
+        <p:spPr>
+          <a:xfrm>
+            <a:off x="1" y="0"/>
+            <a:ext cx="2428239" cy="640080"/>
+          </a:xfrm>
+          <a:prstGeom prst="rect">
+            <a:avLst/>
+          </a:prstGeom>
+        </p:spPr>
+        <p:style>
+          <a:lnRef idx="2">
+            <a:schemeClr val="accent1">
+              <a:shade val="50000"/>
+            </a:schemeClr>
+          </a:lnRef>
+          <a:fillRef idx="1">
+            <a:schemeClr val="accent1"/>
+          </a:fillRef>
+          <a:effectRef idx="0">
+            <a:schemeClr val="accent1"/>
+          </a:effectRef>
+          <a:fontRef idx="minor">
+            <a:schemeClr val="lt1"/>
+          </a:fontRef>
+        </p:style>
+        <p:txBody>
+          <a:bodyPr rtlCol="0" anchor="ctr"/>
+          <a:lstStyle/>
+          <a:p>
+            <a:pPr algn="ctr"/>
+            <a:r>
+              <a:rPr lang="en-US" dirty="0"/>
+              <a:t>Find My Space</a:t>
+            </a:r>
+          </a:p>
+        </p:txBody>
+      </p:sp>
+      <p:sp>
+        <p:nvSpPr>
+          <p:cNvPr id="2" name="Rectangle 1">
+            <a:extLst>
+              <a:ext uri="{FF2B5EF4-FFF2-40B4-BE49-F238E27FC236}">
+                <a16:creationId xmlns:a16="http://schemas.microsoft.com/office/drawing/2014/main" id="{1626EF4F-619E-4134-A9A0-EFE0B183732F}"/>
+              </a:ext>
+            </a:extLst>
+          </p:cNvPr>
+          <p:cNvSpPr/>
+          <p:nvPr/>
+        </p:nvSpPr>
+        <p:spPr>
+          <a:xfrm>
+            <a:off x="4018280" y="4612640"/>
+            <a:ext cx="4094480" cy="457200"/>
+          </a:xfrm>
+          <a:prstGeom prst="rect">
+            <a:avLst/>
+          </a:prstGeom>
+          <a:noFill/>
+        </p:spPr>
+        <p:style>
+          <a:lnRef idx="2">
+            <a:schemeClr val="accent1">
+              <a:shade val="50000"/>
+            </a:schemeClr>
+          </a:lnRef>
+          <a:fillRef idx="1">
+            <a:schemeClr val="accent1"/>
+          </a:fillRef>
+          <a:effectRef idx="0">
+            <a:schemeClr val="accent1"/>
+          </a:effectRef>
+          <a:fontRef idx="minor">
+            <a:schemeClr val="lt1"/>
+          </a:fontRef>
+        </p:style>
+        <p:txBody>
+          <a:bodyPr rtlCol="0" anchor="ctr"/>
+          <a:lstStyle/>
+          <a:p>
+            <a:pPr algn="ctr"/>
+            <a:endParaRPr lang="en-US"/>
+          </a:p>
+        </p:txBody>
+      </p:sp>
+      <p:sp>
+        <p:nvSpPr>
+          <p:cNvPr id="3" name="TextBox 2">
+            <a:extLst>
+              <a:ext uri="{FF2B5EF4-FFF2-40B4-BE49-F238E27FC236}">
+                <a16:creationId xmlns:a16="http://schemas.microsoft.com/office/drawing/2014/main" id="{2A5C766D-CD29-4E2B-87ED-7A370ECB0CCF}"/>
+              </a:ext>
+            </a:extLst>
+          </p:cNvPr>
+          <p:cNvSpPr txBox="1"/>
+          <p:nvPr/>
+        </p:nvSpPr>
+        <p:spPr>
+          <a:xfrm>
+            <a:off x="1971040" y="4656574"/>
+            <a:ext cx="1991360" cy="369332"/>
+          </a:xfrm>
+          <a:prstGeom prst="rect">
+            <a:avLst/>
+          </a:prstGeom>
+          <a:noFill/>
+        </p:spPr>
+        <p:txBody>
+          <a:bodyPr wrap="square" rtlCol="0">
+            <a:spAutoFit/>
+          </a:bodyPr>
+          <a:lstStyle/>
+          <a:p>
+            <a:pPr algn="r"/>
+            <a:r>
+              <a:rPr lang="en-US" dirty="0"/>
+              <a:t>Location</a:t>
+            </a:r>
+          </a:p>
+        </p:txBody>
+      </p:sp>
+      <p:sp>
+        <p:nvSpPr>
+          <p:cNvPr id="18" name="Rectangle 17">
+            <a:extLst>
+              <a:ext uri="{FF2B5EF4-FFF2-40B4-BE49-F238E27FC236}">
+                <a16:creationId xmlns:a16="http://schemas.microsoft.com/office/drawing/2014/main" id="{57ED407D-B299-4DB4-91F3-3CD7938BC8DB}"/>
+              </a:ext>
+            </a:extLst>
+          </p:cNvPr>
+          <p:cNvSpPr/>
+          <p:nvPr/>
+        </p:nvSpPr>
+        <p:spPr>
+          <a:xfrm>
+            <a:off x="4033520" y="5222240"/>
+            <a:ext cx="4094480" cy="457200"/>
+          </a:xfrm>
+          <a:prstGeom prst="rect">
+            <a:avLst/>
+          </a:prstGeom>
+          <a:noFill/>
+        </p:spPr>
+        <p:style>
+          <a:lnRef idx="2">
+            <a:schemeClr val="accent1">
+              <a:shade val="50000"/>
+            </a:schemeClr>
+          </a:lnRef>
+          <a:fillRef idx="1">
+            <a:schemeClr val="accent1"/>
+          </a:fillRef>
+          <a:effectRef idx="0">
+            <a:schemeClr val="accent1"/>
+          </a:effectRef>
+          <a:fontRef idx="minor">
+            <a:schemeClr val="lt1"/>
+          </a:fontRef>
+        </p:style>
+        <p:txBody>
+          <a:bodyPr rtlCol="0" anchor="ctr"/>
+          <a:lstStyle/>
+          <a:p>
+            <a:pPr algn="ctr"/>
+            <a:endParaRPr lang="en-US"/>
+          </a:p>
+        </p:txBody>
+      </p:sp>
+      <p:sp>
+        <p:nvSpPr>
+          <p:cNvPr id="19" name="TextBox 18">
+            <a:extLst>
+              <a:ext uri="{FF2B5EF4-FFF2-40B4-BE49-F238E27FC236}">
+                <a16:creationId xmlns:a16="http://schemas.microsoft.com/office/drawing/2014/main" id="{86993E04-CB87-4581-841D-06AF20314864}"/>
+              </a:ext>
+            </a:extLst>
+          </p:cNvPr>
+          <p:cNvSpPr txBox="1"/>
+          <p:nvPr/>
+        </p:nvSpPr>
+        <p:spPr>
+          <a:xfrm>
+            <a:off x="1986280" y="5266174"/>
+            <a:ext cx="1991360" cy="369332"/>
+          </a:xfrm>
+          <a:prstGeom prst="rect">
+            <a:avLst/>
+          </a:prstGeom>
+          <a:noFill/>
+        </p:spPr>
+        <p:txBody>
+          <a:bodyPr wrap="square" rtlCol="0">
+            <a:spAutoFit/>
+          </a:bodyPr>
+          <a:lstStyle/>
+          <a:p>
+            <a:pPr algn="r"/>
+            <a:r>
+              <a:rPr lang="en-US" dirty="0"/>
+              <a:t>Location</a:t>
+            </a:r>
+          </a:p>
+        </p:txBody>
+      </p:sp>
+      <p:sp>
+        <p:nvSpPr>
           <p:cNvPr id="22" name="Rectangle 21">
             <a:extLst>
               <a:ext uri="{FF2B5EF4-FFF2-40B4-BE49-F238E27FC236}">
@@ -9924,7 +10383,7 @@
 </p:sld>
 </file>
 
-<file path=ppt/slides/slide11.xml><?xml version="1.0" encoding="utf-8"?>
+<file path=ppt/slides/slide12.xml><?xml version="1.0" encoding="utf-8"?>
 <p:sld xmlns:a="http://schemas.openxmlformats.org/drawingml/2006/main" xmlns:r="http://schemas.openxmlformats.org/officeDocument/2006/relationships" xmlns:p="http://schemas.openxmlformats.org/presentationml/2006/main">
   <p:cSld>
     <p:spTree>
@@ -10010,7 +10469,7 @@
 </p:sld>
 </file>
 
-<file path=ppt/slides/slide12.xml><?xml version="1.0" encoding="utf-8"?>
+<file path=ppt/slides/slide13.xml><?xml version="1.0" encoding="utf-8"?>
 <p:sld xmlns:a="http://schemas.openxmlformats.org/drawingml/2006/main" xmlns:r="http://schemas.openxmlformats.org/officeDocument/2006/relationships" xmlns:p="http://schemas.openxmlformats.org/presentationml/2006/main">
   <p:cSld>
     <p:spTree>
@@ -10330,7 +10789,7 @@
 </p:sld>
 </file>
 
-<file path=ppt/slides/slide13.xml><?xml version="1.0" encoding="utf-8"?>
+<file path=ppt/slides/slide14.xml><?xml version="1.0" encoding="utf-8"?>
 <p:sld xmlns:a="http://schemas.openxmlformats.org/drawingml/2006/main" xmlns:r="http://schemas.openxmlformats.org/officeDocument/2006/relationships" xmlns:p="http://schemas.openxmlformats.org/presentationml/2006/main">
   <p:cSld>
     <p:spTree>
@@ -11008,7 +11467,7 @@
 </p:sld>
 </file>
 
-<file path=ppt/slides/slide14.xml><?xml version="1.0" encoding="utf-8"?>
+<file path=ppt/slides/slide15.xml><?xml version="1.0" encoding="utf-8"?>
 <p:sld xmlns:a="http://schemas.openxmlformats.org/drawingml/2006/main" xmlns:r="http://schemas.openxmlformats.org/officeDocument/2006/relationships" xmlns:p="http://schemas.openxmlformats.org/presentationml/2006/main">
   <p:cSld>
     <p:spTree>
@@ -11086,7 +11545,7 @@
 </p:sld>
 </file>
 
-<file path=ppt/slides/slide15.xml><?xml version="1.0" encoding="utf-8"?>
+<file path=ppt/slides/slide16.xml><?xml version="1.0" encoding="utf-8"?>
 <p:sld xmlns:a="http://schemas.openxmlformats.org/drawingml/2006/main" xmlns:r="http://schemas.openxmlformats.org/officeDocument/2006/relationships" xmlns:p="http://schemas.openxmlformats.org/presentationml/2006/main">
   <p:cSld>
     <p:spTree>
@@ -11483,7 +11942,7 @@
 </p:sld>
 </file>
 
-<file path=ppt/slides/slide16.xml><?xml version="1.0" encoding="utf-8"?>
+<file path=ppt/slides/slide17.xml><?xml version="1.0" encoding="utf-8"?>
 <p:sld xmlns:a="http://schemas.openxmlformats.org/drawingml/2006/main" xmlns:r="http://schemas.openxmlformats.org/officeDocument/2006/relationships" xmlns:p="http://schemas.openxmlformats.org/presentationml/2006/main">
   <p:cSld>
     <p:spTree>
@@ -11632,7 +12091,7 @@
 </p:sld>
 </file>
 
-<file path=ppt/slides/slide17.xml><?xml version="1.0" encoding="utf-8"?>
+<file path=ppt/slides/slide18.xml><?xml version="1.0" encoding="utf-8"?>
 <p:sld xmlns:a="http://schemas.openxmlformats.org/drawingml/2006/main" xmlns:r="http://schemas.openxmlformats.org/officeDocument/2006/relationships" xmlns:p="http://schemas.openxmlformats.org/presentationml/2006/main">
   <p:cSld>
     <p:spTree>
@@ -12141,7 +12600,7 @@
 </p:sld>
 </file>
 
-<file path=ppt/slides/slide18.xml><?xml version="1.0" encoding="utf-8"?>
+<file path=ppt/slides/slide19.xml><?xml version="1.0" encoding="utf-8"?>
 <p:sld xmlns:a="http://schemas.openxmlformats.org/drawingml/2006/main" xmlns:r="http://schemas.openxmlformats.org/officeDocument/2006/relationships" xmlns:p="http://schemas.openxmlformats.org/presentationml/2006/main">
   <p:cSld>
     <p:spTree>
@@ -13283,7 +13742,7 @@
         </p:nvSpPr>
         <p:spPr>
           <a:xfrm rot="5400000">
-            <a:off x="3463972" y="3596011"/>
+            <a:off x="8618678" y="4169753"/>
             <a:ext cx="297561" cy="497695"/>
           </a:xfrm>
           <a:prstGeom prst="chevron">
@@ -13452,7 +13911,7 @@
         <p:spPr>
           <a:xfrm>
             <a:off x="2601552" y="2233986"/>
-            <a:ext cx="2198246" cy="1415772"/>
+            <a:ext cx="2198246" cy="1046440"/>
           </a:xfrm>
           <a:prstGeom prst="rect">
             <a:avLst/>
@@ -13479,7 +13938,167 @@
               <a:rPr lang="en-US" sz="1200" dirty="0">
                 <a:latin typeface="Arial Narrow" panose="020B0606020202030204" pitchFamily="34" charset="0"/>
               </a:rPr>
-              <a:t>William believes in using blockchain as a Force for Good.  He believes creating a shared Workspace Community Governed by the Community will revolutionize the way companies are structured</a:t>
+              <a:t>William believes in using blockchain as a Force for Good.  He believes Workspace0x will revolutionize the way companies are managed.  </a:t>
+            </a:r>
+          </a:p>
+        </p:txBody>
+      </p:sp>
+      <p:sp>
+        <p:nvSpPr>
+          <p:cNvPr id="22" name="TextBox 21">
+            <a:extLst>
+              <a:ext uri="{FF2B5EF4-FFF2-40B4-BE49-F238E27FC236}">
+                <a16:creationId xmlns:a16="http://schemas.microsoft.com/office/drawing/2014/main" id="{84B49664-D256-4706-943E-2FDDECDFAB4C}"/>
+              </a:ext>
+            </a:extLst>
+          </p:cNvPr>
+          <p:cNvSpPr txBox="1"/>
+          <p:nvPr/>
+        </p:nvSpPr>
+        <p:spPr>
+          <a:xfrm>
+            <a:off x="4996877" y="2233986"/>
+            <a:ext cx="2198246" cy="1231106"/>
+          </a:xfrm>
+          <a:prstGeom prst="rect">
+            <a:avLst/>
+          </a:prstGeom>
+          <a:noFill/>
+        </p:spPr>
+        <p:txBody>
+          <a:bodyPr wrap="square" rtlCol="0">
+            <a:spAutoFit/>
+          </a:bodyPr>
+          <a:lstStyle/>
+          <a:p>
+            <a:pPr algn="ctr"/>
+            <a:r>
+              <a:rPr lang="en-US" sz="1400" b="1" dirty="0" err="1">
+                <a:latin typeface="Arial Narrow" panose="020B0606020202030204" pitchFamily="34" charset="0"/>
+              </a:rPr>
+              <a:t>Betina</a:t>
+            </a:r>
+            <a:r>
+              <a:rPr lang="en-US" sz="1400" b="1" dirty="0">
+                <a:latin typeface="Arial Narrow" panose="020B0606020202030204" pitchFamily="34" charset="0"/>
+              </a:rPr>
+              <a:t> </a:t>
+            </a:r>
+            <a:r>
+              <a:rPr lang="en-US" sz="1400" b="1" dirty="0" err="1">
+                <a:latin typeface="Arial Narrow" panose="020B0606020202030204" pitchFamily="34" charset="0"/>
+              </a:rPr>
+              <a:t>Schnepf</a:t>
+            </a:r>
+            <a:endParaRPr lang="en-US" sz="1400" b="1" dirty="0">
+              <a:latin typeface="Arial Narrow" panose="020B0606020202030204" pitchFamily="34" charset="0"/>
+            </a:endParaRPr>
+          </a:p>
+          <a:p>
+            <a:pPr algn="ctr"/>
+            <a:r>
+              <a:rPr lang="en-US" sz="1200" dirty="0" err="1">
+                <a:latin typeface="Arial Narrow" panose="020B0606020202030204" pitchFamily="34" charset="0"/>
+              </a:rPr>
+              <a:t>Betina</a:t>
+            </a:r>
+            <a:r>
+              <a:rPr lang="en-US" sz="1200" dirty="0">
+                <a:latin typeface="Arial Narrow" panose="020B0606020202030204" pitchFamily="34" charset="0"/>
+              </a:rPr>
+              <a:t> has a passion for research and a technical mind for the balance between on and off-chain architecture.  She’s also an incredible Front-End Developer. </a:t>
+            </a:r>
+          </a:p>
+        </p:txBody>
+      </p:sp>
+      <p:sp>
+        <p:nvSpPr>
+          <p:cNvPr id="24" name="TextBox 23">
+            <a:extLst>
+              <a:ext uri="{FF2B5EF4-FFF2-40B4-BE49-F238E27FC236}">
+                <a16:creationId xmlns:a16="http://schemas.microsoft.com/office/drawing/2014/main" id="{04A42B12-12C3-498D-94EE-45B619ABD773}"/>
+              </a:ext>
+            </a:extLst>
+          </p:cNvPr>
+          <p:cNvSpPr txBox="1"/>
+          <p:nvPr/>
+        </p:nvSpPr>
+        <p:spPr>
+          <a:xfrm>
+            <a:off x="305470" y="2233986"/>
+            <a:ext cx="2198246" cy="1046440"/>
+          </a:xfrm>
+          <a:prstGeom prst="rect">
+            <a:avLst/>
+          </a:prstGeom>
+          <a:noFill/>
+        </p:spPr>
+        <p:txBody>
+          <a:bodyPr wrap="square" rtlCol="0">
+            <a:spAutoFit/>
+          </a:bodyPr>
+          <a:lstStyle/>
+          <a:p>
+            <a:pPr algn="ctr"/>
+            <a:r>
+              <a:rPr lang="en-US" sz="1400" b="1" dirty="0">
+                <a:latin typeface="Arial Narrow" panose="020B0606020202030204" pitchFamily="34" charset="0"/>
+              </a:rPr>
+              <a:t>Michael </a:t>
+            </a:r>
+            <a:r>
+              <a:rPr lang="en-US" sz="1400" b="1" dirty="0" err="1">
+                <a:latin typeface="Arial Narrow" panose="020B0606020202030204" pitchFamily="34" charset="0"/>
+              </a:rPr>
+              <a:t>Nolivos</a:t>
+            </a:r>
+            <a:endParaRPr lang="en-US" sz="1400" b="1" dirty="0">
+              <a:latin typeface="Arial Narrow" panose="020B0606020202030204" pitchFamily="34" charset="0"/>
+            </a:endParaRPr>
+          </a:p>
+          <a:p>
+            <a:pPr algn="ctr"/>
+            <a:r>
+              <a:rPr lang="en-US" sz="1200" dirty="0">
+                <a:latin typeface="Arial Narrow" panose="020B0606020202030204" pitchFamily="34" charset="0"/>
+              </a:rPr>
+              <a:t>Michael is passionate about using blockchain to create more valuable win-win Business 2 Worker models.  He’s a strong Full-Stack developer.</a:t>
+            </a:r>
+          </a:p>
+        </p:txBody>
+      </p:sp>
+      <p:sp>
+        <p:nvSpPr>
+          <p:cNvPr id="25" name="TextBox 24">
+            <a:extLst>
+              <a:ext uri="{FF2B5EF4-FFF2-40B4-BE49-F238E27FC236}">
+                <a16:creationId xmlns:a16="http://schemas.microsoft.com/office/drawing/2014/main" id="{0909E16D-DBED-433D-A771-DF651DE4E434}"/>
+              </a:ext>
+            </a:extLst>
+          </p:cNvPr>
+          <p:cNvSpPr txBox="1"/>
+          <p:nvPr/>
+        </p:nvSpPr>
+        <p:spPr>
+          <a:xfrm>
+            <a:off x="-17530" y="3919349"/>
+            <a:ext cx="7381840" cy="430887"/>
+          </a:xfrm>
+          <a:prstGeom prst="rect">
+            <a:avLst/>
+          </a:prstGeom>
+          <a:noFill/>
+        </p:spPr>
+        <p:txBody>
+          <a:bodyPr wrap="square" rtlCol="0">
+            <a:spAutoFit/>
+          </a:bodyPr>
+          <a:lstStyle/>
+          <a:p>
+            <a:pPr algn="ctr"/>
+            <a:r>
+              <a:rPr lang="en-US" sz="2200" dirty="0"/>
+              <a:t>The Workforce</a:t>
             </a:r>
           </a:p>
         </p:txBody>
@@ -13487,7 +14106,7 @@
     </p:spTree>
     <p:extLst>
       <p:ext uri="{BB962C8B-B14F-4D97-AF65-F5344CB8AC3E}">
-        <p14:creationId xmlns:p14="http://schemas.microsoft.com/office/powerpoint/2010/main" val="2356741573"/>
+        <p14:creationId xmlns:p14="http://schemas.microsoft.com/office/powerpoint/2010/main" val="44050594"/>
       </p:ext>
     </p:extLst>
   </p:cSld>
@@ -13516,6 +14135,697 @@
       </p:grpSpPr>
       <p:sp>
         <p:nvSpPr>
+          <p:cNvPr id="27" name="Rectangle 26">
+            <a:extLst>
+              <a:ext uri="{FF2B5EF4-FFF2-40B4-BE49-F238E27FC236}">
+                <a16:creationId xmlns:a16="http://schemas.microsoft.com/office/drawing/2014/main" id="{695416FD-4D85-4E03-B9FF-2868A7B4E68A}"/>
+              </a:ext>
+            </a:extLst>
+          </p:cNvPr>
+          <p:cNvSpPr/>
+          <p:nvPr/>
+        </p:nvSpPr>
+        <p:spPr>
+          <a:xfrm>
+            <a:off x="0" y="-245"/>
+            <a:ext cx="7392202" cy="348647"/>
+          </a:xfrm>
+          <a:prstGeom prst="rect">
+            <a:avLst/>
+          </a:prstGeom>
+          <a:solidFill>
+            <a:schemeClr val="bg1">
+              <a:lumMod val="95000"/>
+            </a:schemeClr>
+          </a:solidFill>
+          <a:ln>
+            <a:solidFill>
+              <a:schemeClr val="bg1">
+                <a:lumMod val="95000"/>
+              </a:schemeClr>
+            </a:solidFill>
+          </a:ln>
+        </p:spPr>
+        <p:style>
+          <a:lnRef idx="2">
+            <a:schemeClr val="accent1">
+              <a:shade val="50000"/>
+            </a:schemeClr>
+          </a:lnRef>
+          <a:fillRef idx="1">
+            <a:schemeClr val="accent1"/>
+          </a:fillRef>
+          <a:effectRef idx="0">
+            <a:schemeClr val="accent1"/>
+          </a:effectRef>
+          <a:fontRef idx="minor">
+            <a:schemeClr val="lt1"/>
+          </a:fontRef>
+        </p:style>
+        <p:txBody>
+          <a:bodyPr rtlCol="0" anchor="ctr"/>
+          <a:lstStyle/>
+          <a:p>
+            <a:pPr algn="ctr"/>
+            <a:endParaRPr lang="en-US"/>
+          </a:p>
+        </p:txBody>
+      </p:sp>
+      <p:sp>
+        <p:nvSpPr>
+          <p:cNvPr id="13" name="Rectangle 12">
+            <a:extLst>
+              <a:ext uri="{FF2B5EF4-FFF2-40B4-BE49-F238E27FC236}">
+                <a16:creationId xmlns:a16="http://schemas.microsoft.com/office/drawing/2014/main" id="{F69CEBC5-AFE9-4CA5-A08B-340F861A782E}"/>
+              </a:ext>
+            </a:extLst>
+          </p:cNvPr>
+          <p:cNvSpPr/>
+          <p:nvPr/>
+        </p:nvSpPr>
+        <p:spPr>
+          <a:xfrm>
+            <a:off x="7392202" y="0"/>
+            <a:ext cx="4799798" cy="564774"/>
+          </a:xfrm>
+          <a:prstGeom prst="rect">
+            <a:avLst/>
+          </a:prstGeom>
+        </p:spPr>
+        <p:style>
+          <a:lnRef idx="2">
+            <a:schemeClr val="dk1">
+              <a:shade val="50000"/>
+            </a:schemeClr>
+          </a:lnRef>
+          <a:fillRef idx="1">
+            <a:schemeClr val="dk1"/>
+          </a:fillRef>
+          <a:effectRef idx="0">
+            <a:schemeClr val="dk1"/>
+          </a:effectRef>
+          <a:fontRef idx="minor">
+            <a:schemeClr val="lt1"/>
+          </a:fontRef>
+        </p:style>
+        <p:txBody>
+          <a:bodyPr rtlCol="0" anchor="ctr"/>
+          <a:lstStyle/>
+          <a:p>
+            <a:pPr algn="ctr"/>
+            <a:r>
+              <a:rPr lang="en-US" dirty="0"/>
+              <a:t>Home: Button-&gt; About-&gt;Team </a:t>
+            </a:r>
+          </a:p>
+        </p:txBody>
+      </p:sp>
+      <p:sp>
+        <p:nvSpPr>
+          <p:cNvPr id="23" name="TextBox 22">
+            <a:extLst>
+              <a:ext uri="{FF2B5EF4-FFF2-40B4-BE49-F238E27FC236}">
+                <a16:creationId xmlns:a16="http://schemas.microsoft.com/office/drawing/2014/main" id="{62D5140A-513C-4AA9-A5BF-321CB5B5A448}"/>
+              </a:ext>
+            </a:extLst>
+          </p:cNvPr>
+          <p:cNvSpPr txBox="1"/>
+          <p:nvPr/>
+        </p:nvSpPr>
+        <p:spPr>
+          <a:xfrm>
+            <a:off x="7392202" y="564774"/>
+            <a:ext cx="4799798" cy="369332"/>
+          </a:xfrm>
+          <a:prstGeom prst="rect">
+            <a:avLst/>
+          </a:prstGeom>
+          <a:noFill/>
+        </p:spPr>
+        <p:txBody>
+          <a:bodyPr wrap="square" rtlCol="0">
+            <a:spAutoFit/>
+          </a:bodyPr>
+          <a:lstStyle/>
+          <a:p>
+            <a:r>
+              <a:rPr lang="en-US" dirty="0"/>
+              <a:t>What We Do</a:t>
+            </a:r>
+          </a:p>
+        </p:txBody>
+      </p:sp>
+      <p:grpSp>
+        <p:nvGrpSpPr>
+          <p:cNvPr id="31" name="Group 30">
+            <a:extLst>
+              <a:ext uri="{FF2B5EF4-FFF2-40B4-BE49-F238E27FC236}">
+                <a16:creationId xmlns:a16="http://schemas.microsoft.com/office/drawing/2014/main" id="{EAAB2615-1820-4919-A703-C438B970ADFF}"/>
+              </a:ext>
+            </a:extLst>
+          </p:cNvPr>
+          <p:cNvGrpSpPr/>
+          <p:nvPr/>
+        </p:nvGrpSpPr>
+        <p:grpSpPr>
+          <a:xfrm>
+            <a:off x="33109" y="2610"/>
+            <a:ext cx="7348731" cy="348646"/>
+            <a:chOff x="33109" y="2610"/>
+            <a:chExt cx="7348731" cy="348646"/>
+          </a:xfrm>
+        </p:grpSpPr>
+        <p:pic>
+          <p:nvPicPr>
+            <p:cNvPr id="32" name="Picture 2" descr="Workspace0x">
+              <a:extLst>
+                <a:ext uri="{FF2B5EF4-FFF2-40B4-BE49-F238E27FC236}">
+                  <a16:creationId xmlns:a16="http://schemas.microsoft.com/office/drawing/2014/main" id="{E3419DC1-841E-4A3F-BD3D-27AADA64BA87}"/>
+                </a:ext>
+              </a:extLst>
+            </p:cNvPr>
+            <p:cNvPicPr>
+              <a:picLocks noChangeAspect="1" noChangeArrowheads="1"/>
+            </p:cNvPicPr>
+            <p:nvPr/>
+          </p:nvPicPr>
+          <p:blipFill>
+            <a:blip r:embed="rId2">
+              <a:extLst>
+                <a:ext uri="{28A0092B-C50C-407E-A947-70E740481C1C}">
+                  <a14:useLocalDpi xmlns:a14="http://schemas.microsoft.com/office/drawing/2010/main" val="0"/>
+                </a:ext>
+              </a:extLst>
+            </a:blip>
+            <a:srcRect/>
+            <a:stretch>
+              <a:fillRect/>
+            </a:stretch>
+          </p:blipFill>
+          <p:spPr bwMode="auto">
+            <a:xfrm>
+              <a:off x="33109" y="22155"/>
+              <a:ext cx="1235548" cy="309557"/>
+            </a:xfrm>
+            <a:prstGeom prst="rect">
+              <a:avLst/>
+            </a:prstGeom>
+            <a:noFill/>
+            <a:extLst>
+              <a:ext uri="{909E8E84-426E-40DD-AFC4-6F175D3DCCD1}">
+                <a14:hiddenFill xmlns:a14="http://schemas.microsoft.com/office/drawing/2010/main">
+                  <a:solidFill>
+                    <a:srgbClr val="FFFFFF"/>
+                  </a:solidFill>
+                </a14:hiddenFill>
+              </a:ext>
+            </a:extLst>
+          </p:spPr>
+        </p:pic>
+        <p:sp>
+          <p:nvSpPr>
+            <p:cNvPr id="33" name="Rectangle 32">
+              <a:extLst>
+                <a:ext uri="{FF2B5EF4-FFF2-40B4-BE49-F238E27FC236}">
+                  <a16:creationId xmlns:a16="http://schemas.microsoft.com/office/drawing/2014/main" id="{220C2A14-68FA-4BC6-AAC4-9FBD3AE19FB7}"/>
+                </a:ext>
+              </a:extLst>
+            </p:cNvPr>
+            <p:cNvSpPr/>
+            <p:nvPr/>
+          </p:nvSpPr>
+          <p:spPr>
+            <a:xfrm>
+              <a:off x="5939120" y="2610"/>
+              <a:ext cx="1442720" cy="348646"/>
+            </a:xfrm>
+            <a:prstGeom prst="rect">
+              <a:avLst/>
+            </a:prstGeom>
+            <a:solidFill>
+              <a:srgbClr val="006EBC"/>
+            </a:solidFill>
+            <a:ln>
+              <a:solidFill>
+                <a:srgbClr val="006EBC"/>
+              </a:solidFill>
+            </a:ln>
+          </p:spPr>
+          <p:style>
+            <a:lnRef idx="2">
+              <a:schemeClr val="accent1">
+                <a:shade val="50000"/>
+              </a:schemeClr>
+            </a:lnRef>
+            <a:fillRef idx="1">
+              <a:schemeClr val="accent1"/>
+            </a:fillRef>
+            <a:effectRef idx="0">
+              <a:schemeClr val="accent1"/>
+            </a:effectRef>
+            <a:fontRef idx="minor">
+              <a:schemeClr val="lt1"/>
+            </a:fontRef>
+          </p:style>
+          <p:txBody>
+            <a:bodyPr rtlCol="0" anchor="ctr"/>
+            <a:lstStyle/>
+            <a:p>
+              <a:pPr algn="ctr"/>
+              <a:r>
+                <a:rPr lang="en-US" sz="1200" dirty="0">
+                  <a:latin typeface="Arial Narrow" panose="020B0606020202030204" pitchFamily="34" charset="0"/>
+                </a:rPr>
+                <a:t>Find a Career</a:t>
+              </a:r>
+            </a:p>
+          </p:txBody>
+        </p:sp>
+        <p:sp>
+          <p:nvSpPr>
+            <p:cNvPr id="34" name="Rectangle 33">
+              <a:extLst>
+                <a:ext uri="{FF2B5EF4-FFF2-40B4-BE49-F238E27FC236}">
+                  <a16:creationId xmlns:a16="http://schemas.microsoft.com/office/drawing/2014/main" id="{35FC1E31-977F-4BE4-8DF5-958220FCF973}"/>
+                </a:ext>
+              </a:extLst>
+            </p:cNvPr>
+            <p:cNvSpPr/>
+            <p:nvPr/>
+          </p:nvSpPr>
+          <p:spPr>
+            <a:xfrm>
+              <a:off x="1729197" y="37129"/>
+              <a:ext cx="872355" cy="276999"/>
+            </a:xfrm>
+            <a:prstGeom prst="rect">
+              <a:avLst/>
+            </a:prstGeom>
+          </p:spPr>
+          <p:txBody>
+            <a:bodyPr wrap="none">
+              <a:spAutoFit/>
+            </a:bodyPr>
+            <a:lstStyle/>
+            <a:p>
+              <a:pPr algn="ctr"/>
+              <a:r>
+                <a:rPr lang="en-US" sz="1200" dirty="0">
+                  <a:latin typeface="Arial Narrow" panose="020B0606020202030204" pitchFamily="34" charset="0"/>
+                </a:rPr>
+                <a:t>Governance</a:t>
+              </a:r>
+            </a:p>
+          </p:txBody>
+        </p:sp>
+        <p:sp>
+          <p:nvSpPr>
+            <p:cNvPr id="35" name="Rectangle 34">
+              <a:extLst>
+                <a:ext uri="{FF2B5EF4-FFF2-40B4-BE49-F238E27FC236}">
+                  <a16:creationId xmlns:a16="http://schemas.microsoft.com/office/drawing/2014/main" id="{61C6391A-D68F-48AA-B5AC-8FAFB96DD516}"/>
+                </a:ext>
+              </a:extLst>
+            </p:cNvPr>
+            <p:cNvSpPr/>
+            <p:nvPr/>
+          </p:nvSpPr>
+          <p:spPr>
+            <a:xfrm>
+              <a:off x="2711316" y="37129"/>
+              <a:ext cx="516488" cy="276999"/>
+            </a:xfrm>
+            <a:prstGeom prst="rect">
+              <a:avLst/>
+            </a:prstGeom>
+          </p:spPr>
+          <p:txBody>
+            <a:bodyPr wrap="none">
+              <a:spAutoFit/>
+            </a:bodyPr>
+            <a:lstStyle/>
+            <a:p>
+              <a:pPr algn="ctr"/>
+              <a:r>
+                <a:rPr lang="en-US" sz="1200" dirty="0">
+                  <a:latin typeface="Arial Narrow" panose="020B0606020202030204" pitchFamily="34" charset="0"/>
+                </a:rPr>
+                <a:t>About</a:t>
+              </a:r>
+            </a:p>
+          </p:txBody>
+        </p:sp>
+        <p:sp>
+          <p:nvSpPr>
+            <p:cNvPr id="36" name="Rectangle 35">
+              <a:extLst>
+                <a:ext uri="{FF2B5EF4-FFF2-40B4-BE49-F238E27FC236}">
+                  <a16:creationId xmlns:a16="http://schemas.microsoft.com/office/drawing/2014/main" id="{DEF6CCF0-7A40-40B1-9703-9A4E91018921}"/>
+                </a:ext>
+              </a:extLst>
+            </p:cNvPr>
+            <p:cNvSpPr/>
+            <p:nvPr/>
+          </p:nvSpPr>
+          <p:spPr>
+            <a:xfrm>
+              <a:off x="3389864" y="32793"/>
+              <a:ext cx="724878" cy="276999"/>
+            </a:xfrm>
+            <a:prstGeom prst="rect">
+              <a:avLst/>
+            </a:prstGeom>
+          </p:spPr>
+          <p:txBody>
+            <a:bodyPr wrap="none">
+              <a:spAutoFit/>
+            </a:bodyPr>
+            <a:lstStyle/>
+            <a:p>
+              <a:pPr algn="ctr"/>
+              <a:r>
+                <a:rPr lang="en-US" sz="1200" dirty="0">
+                  <a:latin typeface="Arial Narrow" panose="020B0606020202030204" pitchFamily="34" charset="0"/>
+                </a:rPr>
+                <a:t>Locations</a:t>
+              </a:r>
+            </a:p>
+          </p:txBody>
+        </p:sp>
+      </p:grpSp>
+      <p:sp>
+        <p:nvSpPr>
+          <p:cNvPr id="40" name="Arrow: Chevron 39">
+            <a:extLst>
+              <a:ext uri="{FF2B5EF4-FFF2-40B4-BE49-F238E27FC236}">
+                <a16:creationId xmlns:a16="http://schemas.microsoft.com/office/drawing/2014/main" id="{CB4EA55F-DA8A-447E-8A87-0C3BE64133BB}"/>
+              </a:ext>
+            </a:extLst>
+          </p:cNvPr>
+          <p:cNvSpPr/>
+          <p:nvPr/>
+        </p:nvSpPr>
+        <p:spPr>
+          <a:xfrm rot="5400000">
+            <a:off x="8618678" y="4169753"/>
+            <a:ext cx="297561" cy="497695"/>
+          </a:xfrm>
+          <a:prstGeom prst="chevron">
+            <a:avLst>
+              <a:gd name="adj" fmla="val 72733"/>
+            </a:avLst>
+          </a:prstGeom>
+          <a:solidFill>
+            <a:schemeClr val="bg2">
+              <a:lumMod val="90000"/>
+            </a:schemeClr>
+          </a:solidFill>
+          <a:ln>
+            <a:noFill/>
+          </a:ln>
+        </p:spPr>
+        <p:style>
+          <a:lnRef idx="2">
+            <a:schemeClr val="accent1">
+              <a:shade val="50000"/>
+            </a:schemeClr>
+          </a:lnRef>
+          <a:fillRef idx="1">
+            <a:schemeClr val="accent1"/>
+          </a:fillRef>
+          <a:effectRef idx="0">
+            <a:schemeClr val="accent1"/>
+          </a:effectRef>
+          <a:fontRef idx="minor">
+            <a:schemeClr val="lt1"/>
+          </a:fontRef>
+        </p:style>
+        <p:txBody>
+          <a:bodyPr rtlCol="0" anchor="ctr"/>
+          <a:lstStyle/>
+          <a:p>
+            <a:pPr algn="ctr"/>
+            <a:endParaRPr lang="en-US">
+              <a:solidFill>
+                <a:schemeClr val="tx1"/>
+              </a:solidFill>
+            </a:endParaRPr>
+          </a:p>
+        </p:txBody>
+      </p:sp>
+      <p:sp>
+        <p:nvSpPr>
+          <p:cNvPr id="30" name="TextBox 29">
+            <a:extLst>
+              <a:ext uri="{FF2B5EF4-FFF2-40B4-BE49-F238E27FC236}">
+                <a16:creationId xmlns:a16="http://schemas.microsoft.com/office/drawing/2014/main" id="{0E8C3258-E2ED-4CB4-AA28-F059C53CFBA6}"/>
+              </a:ext>
+            </a:extLst>
+          </p:cNvPr>
+          <p:cNvSpPr txBox="1"/>
+          <p:nvPr/>
+        </p:nvSpPr>
+        <p:spPr>
+          <a:xfrm>
+            <a:off x="0" y="388630"/>
+            <a:ext cx="7381840" cy="430887"/>
+          </a:xfrm>
+          <a:prstGeom prst="rect">
+            <a:avLst/>
+          </a:prstGeom>
+          <a:noFill/>
+        </p:spPr>
+        <p:txBody>
+          <a:bodyPr wrap="square" rtlCol="0">
+            <a:spAutoFit/>
+          </a:bodyPr>
+          <a:lstStyle/>
+          <a:p>
+            <a:pPr algn="ctr"/>
+            <a:r>
+              <a:rPr lang="en-US" sz="2200" dirty="0"/>
+              <a:t>The Workforce</a:t>
+            </a:r>
+          </a:p>
+        </p:txBody>
+      </p:sp>
+      <p:sp>
+        <p:nvSpPr>
+          <p:cNvPr id="21" name="TextBox 20">
+            <a:extLst>
+              <a:ext uri="{FF2B5EF4-FFF2-40B4-BE49-F238E27FC236}">
+                <a16:creationId xmlns:a16="http://schemas.microsoft.com/office/drawing/2014/main" id="{754783BB-DF18-4496-BFA8-F59165A25799}"/>
+              </a:ext>
+            </a:extLst>
+          </p:cNvPr>
+          <p:cNvSpPr txBox="1"/>
+          <p:nvPr/>
+        </p:nvSpPr>
+        <p:spPr>
+          <a:xfrm>
+            <a:off x="2537011" y="2537565"/>
+            <a:ext cx="2395325" cy="1231106"/>
+          </a:xfrm>
+          <a:prstGeom prst="rect">
+            <a:avLst/>
+          </a:prstGeom>
+          <a:noFill/>
+        </p:spPr>
+        <p:txBody>
+          <a:bodyPr wrap="square" rtlCol="0">
+            <a:spAutoFit/>
+          </a:bodyPr>
+          <a:lstStyle/>
+          <a:p>
+            <a:pPr algn="ctr"/>
+            <a:r>
+              <a:rPr lang="en-US" sz="1400" b="1" dirty="0">
+                <a:latin typeface="Arial Narrow" panose="020B0606020202030204" pitchFamily="34" charset="0"/>
+              </a:rPr>
+              <a:t>Diverse Backgrounds</a:t>
+            </a:r>
+          </a:p>
+          <a:p>
+            <a:pPr algn="ctr"/>
+            <a:r>
+              <a:rPr lang="en-US" sz="1200" dirty="0">
+                <a:latin typeface="Arial Narrow" panose="020B0606020202030204" pitchFamily="34" charset="0"/>
+              </a:rPr>
+              <a:t>Full-Stack Developers, Blockchain Engineers, Project Managers, and UI/UX Designers are just a sample of the expertise the community has to offer your project</a:t>
+            </a:r>
+          </a:p>
+        </p:txBody>
+      </p:sp>
+      <p:sp>
+        <p:nvSpPr>
+          <p:cNvPr id="22" name="TextBox 21">
+            <a:extLst>
+              <a:ext uri="{FF2B5EF4-FFF2-40B4-BE49-F238E27FC236}">
+                <a16:creationId xmlns:a16="http://schemas.microsoft.com/office/drawing/2014/main" id="{84B49664-D256-4706-943E-2FDDECDFAB4C}"/>
+              </a:ext>
+            </a:extLst>
+          </p:cNvPr>
+          <p:cNvSpPr txBox="1"/>
+          <p:nvPr/>
+        </p:nvSpPr>
+        <p:spPr>
+          <a:xfrm>
+            <a:off x="4932336" y="2537565"/>
+            <a:ext cx="2395325" cy="1600438"/>
+          </a:xfrm>
+          <a:prstGeom prst="rect">
+            <a:avLst/>
+          </a:prstGeom>
+          <a:noFill/>
+        </p:spPr>
+        <p:txBody>
+          <a:bodyPr wrap="square" rtlCol="0">
+            <a:spAutoFit/>
+          </a:bodyPr>
+          <a:lstStyle/>
+          <a:p>
+            <a:pPr algn="ctr"/>
+            <a:r>
+              <a:rPr lang="en-US" sz="1400" b="1" dirty="0">
+                <a:latin typeface="Arial Narrow" panose="020B0606020202030204" pitchFamily="34" charset="0"/>
+              </a:rPr>
+              <a:t>Continuous Innovators</a:t>
+            </a:r>
+          </a:p>
+          <a:p>
+            <a:pPr algn="ctr"/>
+            <a:r>
+              <a:rPr lang="en-US" sz="1200" dirty="0">
+                <a:latin typeface="Arial Narrow" panose="020B0606020202030204" pitchFamily="34" charset="0"/>
+              </a:rPr>
+              <a:t>The workforce is naturally inclined to pushing the envelope of technological innovation.  To maximize value generation, the community voted governance protocol also monetarily incentivizes cross worker interaction and training.  </a:t>
+            </a:r>
+          </a:p>
+        </p:txBody>
+      </p:sp>
+      <p:sp>
+        <p:nvSpPr>
+          <p:cNvPr id="24" name="TextBox 23">
+            <a:extLst>
+              <a:ext uri="{FF2B5EF4-FFF2-40B4-BE49-F238E27FC236}">
+                <a16:creationId xmlns:a16="http://schemas.microsoft.com/office/drawing/2014/main" id="{04A42B12-12C3-498D-94EE-45B619ABD773}"/>
+              </a:ext>
+            </a:extLst>
+          </p:cNvPr>
+          <p:cNvSpPr txBox="1"/>
+          <p:nvPr/>
+        </p:nvSpPr>
+        <p:spPr>
+          <a:xfrm>
+            <a:off x="240930" y="2537565"/>
+            <a:ext cx="2312894" cy="1046440"/>
+          </a:xfrm>
+          <a:prstGeom prst="rect">
+            <a:avLst/>
+          </a:prstGeom>
+          <a:noFill/>
+        </p:spPr>
+        <p:txBody>
+          <a:bodyPr wrap="square" rtlCol="0">
+            <a:spAutoFit/>
+          </a:bodyPr>
+          <a:lstStyle/>
+          <a:p>
+            <a:pPr algn="ctr"/>
+            <a:r>
+              <a:rPr lang="en-US" sz="1400" b="1" dirty="0">
+                <a:latin typeface="Arial Narrow" panose="020B0606020202030204" pitchFamily="34" charset="0"/>
+              </a:rPr>
+              <a:t>Geographically Distributed</a:t>
+            </a:r>
+          </a:p>
+          <a:p>
+            <a:pPr algn="ctr"/>
+            <a:r>
+              <a:rPr lang="en-US" sz="1200" dirty="0">
+                <a:latin typeface="Arial Narrow" panose="020B0606020202030204" pitchFamily="34" charset="0"/>
+              </a:rPr>
+              <a:t>Latest statistics from the platform show the workforce is comprised of individuals all across the US from the East to West Coast. </a:t>
+            </a:r>
+          </a:p>
+        </p:txBody>
+      </p:sp>
+      <p:pic>
+        <p:nvPicPr>
+          <p:cNvPr id="8" name="Picture 7">
+            <a:extLst>
+              <a:ext uri="{FF2B5EF4-FFF2-40B4-BE49-F238E27FC236}">
+                <a16:creationId xmlns:a16="http://schemas.microsoft.com/office/drawing/2014/main" id="{EA5002B3-F8AC-4FD8-B43B-D27F2BAA618A}"/>
+              </a:ext>
+            </a:extLst>
+          </p:cNvPr>
+          <p:cNvPicPr>
+            <a:picLocks noChangeAspect="1"/>
+          </p:cNvPicPr>
+          <p:nvPr/>
+        </p:nvPicPr>
+        <p:blipFill rotWithShape="1">
+          <a:blip r:embed="rId3">
+            <a:extLst>
+              <a:ext uri="{BEBA8EAE-BF5A-486C-A8C5-ECC9F3942E4B}">
+                <a14:imgProps xmlns:a14="http://schemas.microsoft.com/office/drawing/2010/main">
+                  <a14:imgLayer r:embed="rId4">
+                    <a14:imgEffect>
+                      <a14:brightnessContrast bright="19000"/>
+                    </a14:imgEffect>
+                  </a14:imgLayer>
+                </a14:imgProps>
+              </a:ext>
+              <a:ext uri="{28A0092B-C50C-407E-A947-70E740481C1C}">
+                <a14:useLocalDpi xmlns:a14="http://schemas.microsoft.com/office/drawing/2010/main" val="0"/>
+              </a:ext>
+            </a:extLst>
+          </a:blip>
+          <a:srcRect b="15118"/>
+          <a:stretch/>
+        </p:blipFill>
+        <p:spPr>
+          <a:xfrm>
+            <a:off x="762643" y="819517"/>
+            <a:ext cx="5790557" cy="1636342"/>
+          </a:xfrm>
+          <a:prstGeom prst="rect">
+            <a:avLst/>
+          </a:prstGeom>
+        </p:spPr>
+      </p:pic>
+    </p:spTree>
+    <p:extLst>
+      <p:ext uri="{BB962C8B-B14F-4D97-AF65-F5344CB8AC3E}">
+        <p14:creationId xmlns:p14="http://schemas.microsoft.com/office/powerpoint/2010/main" val="2356741573"/>
+      </p:ext>
+    </p:extLst>
+  </p:cSld>
+  <p:clrMapOvr>
+    <a:masterClrMapping/>
+  </p:clrMapOvr>
+</p:sld>
+</file>
+
+<file path=ppt/slides/slide5.xml><?xml version="1.0" encoding="utf-8"?>
+<p:sld xmlns:a="http://schemas.openxmlformats.org/drawingml/2006/main" xmlns:r="http://schemas.openxmlformats.org/officeDocument/2006/relationships" xmlns:p="http://schemas.openxmlformats.org/presentationml/2006/main">
+  <p:cSld>
+    <p:spTree>
+      <p:nvGrpSpPr>
+        <p:cNvPr id="1" name=""/>
+        <p:cNvGrpSpPr/>
+        <p:nvPr/>
+      </p:nvGrpSpPr>
+      <p:grpSpPr>
+        <a:xfrm>
+          <a:off x="0" y="0"/>
+          <a:ext cx="0" cy="0"/>
+          <a:chOff x="0" y="0"/>
+          <a:chExt cx="0" cy="0"/>
+        </a:xfrm>
+      </p:grpSpPr>
+      <p:sp>
+        <p:nvSpPr>
           <p:cNvPr id="2" name="Title 1">
             <a:extLst>
               <a:ext uri="{FF2B5EF4-FFF2-40B4-BE49-F238E27FC236}">
@@ -13580,7 +14890,7 @@
 </p:sld>
 </file>
 
-<file path=ppt/slides/slide5.xml><?xml version="1.0" encoding="utf-8"?>
+<file path=ppt/slides/slide6.xml><?xml version="1.0" encoding="utf-8"?>
 <p:sld xmlns:a="http://schemas.openxmlformats.org/drawingml/2006/main" xmlns:r="http://schemas.openxmlformats.org/officeDocument/2006/relationships" xmlns:p="http://schemas.openxmlformats.org/presentationml/2006/main">
   <p:cSld>
     <p:spTree>
@@ -14314,7 +15624,7 @@
 </p:sld>
 </file>
 
-<file path=ppt/slides/slide6.xml><?xml version="1.0" encoding="utf-8"?>
+<file path=ppt/slides/slide7.xml><?xml version="1.0" encoding="utf-8"?>
 <p:sld xmlns:a="http://schemas.openxmlformats.org/drawingml/2006/main" xmlns:r="http://schemas.openxmlformats.org/officeDocument/2006/relationships" xmlns:p="http://schemas.openxmlformats.org/presentationml/2006/main">
   <p:cSld>
     <p:spTree>
@@ -15462,7 +16772,7 @@
 </p:sld>
 </file>
 
-<file path=ppt/slides/slide7.xml><?xml version="1.0" encoding="utf-8"?>
+<file path=ppt/slides/slide8.xml><?xml version="1.0" encoding="utf-8"?>
 <p:sld xmlns:a="http://schemas.openxmlformats.org/drawingml/2006/main" xmlns:r="http://schemas.openxmlformats.org/officeDocument/2006/relationships" xmlns:p="http://schemas.openxmlformats.org/presentationml/2006/main">
   <p:cSld>
     <p:spTree>
@@ -16678,7 +17988,7 @@
 </p:sld>
 </file>
 
-<file path=ppt/slides/slide8.xml><?xml version="1.0" encoding="utf-8"?>
+<file path=ppt/slides/slide9.xml><?xml version="1.0" encoding="utf-8"?>
 <p:sld xmlns:a="http://schemas.openxmlformats.org/drawingml/2006/main" xmlns:r="http://schemas.openxmlformats.org/officeDocument/2006/relationships" xmlns:p="http://schemas.openxmlformats.org/presentationml/2006/main">
   <p:cSld>
     <p:spTree>
@@ -17316,425 +18626,6 @@
     <p:extLst>
       <p:ext uri="{BB962C8B-B14F-4D97-AF65-F5344CB8AC3E}">
         <p14:creationId xmlns:p14="http://schemas.microsoft.com/office/powerpoint/2010/main" val="401183394"/>
-      </p:ext>
-    </p:extLst>
-  </p:cSld>
-  <p:clrMapOvr>
-    <a:masterClrMapping/>
-  </p:clrMapOvr>
-</p:sld>
-</file>
-
-<file path=ppt/slides/slide9.xml><?xml version="1.0" encoding="utf-8"?>
-<p:sld xmlns:a="http://schemas.openxmlformats.org/drawingml/2006/main" xmlns:r="http://schemas.openxmlformats.org/officeDocument/2006/relationships" xmlns:p="http://schemas.openxmlformats.org/presentationml/2006/main">
-  <p:cSld>
-    <p:spTree>
-      <p:nvGrpSpPr>
-        <p:cNvPr id="1" name=""/>
-        <p:cNvGrpSpPr/>
-        <p:nvPr/>
-      </p:nvGrpSpPr>
-      <p:grpSpPr>
-        <a:xfrm>
-          <a:off x="0" y="0"/>
-          <a:ext cx="0" cy="0"/>
-          <a:chOff x="0" y="0"/>
-          <a:chExt cx="0" cy="0"/>
-        </a:xfrm>
-      </p:grpSpPr>
-      <p:sp>
-        <p:nvSpPr>
-          <p:cNvPr id="6" name="Rectangle 5">
-            <a:extLst>
-              <a:ext uri="{FF2B5EF4-FFF2-40B4-BE49-F238E27FC236}">
-                <a16:creationId xmlns:a16="http://schemas.microsoft.com/office/drawing/2014/main" id="{BE21B872-4817-42CC-AC91-C88120918379}"/>
-              </a:ext>
-            </a:extLst>
-          </p:cNvPr>
-          <p:cNvSpPr/>
-          <p:nvPr/>
-        </p:nvSpPr>
-        <p:spPr>
-          <a:xfrm>
-            <a:off x="1" y="0"/>
-            <a:ext cx="2428239" cy="640080"/>
-          </a:xfrm>
-          <a:prstGeom prst="rect">
-            <a:avLst/>
-          </a:prstGeom>
-        </p:spPr>
-        <p:style>
-          <a:lnRef idx="2">
-            <a:schemeClr val="accent1">
-              <a:shade val="50000"/>
-            </a:schemeClr>
-          </a:lnRef>
-          <a:fillRef idx="1">
-            <a:schemeClr val="accent1"/>
-          </a:fillRef>
-          <a:effectRef idx="0">
-            <a:schemeClr val="accent1"/>
-          </a:effectRef>
-          <a:fontRef idx="minor">
-            <a:schemeClr val="lt1"/>
-          </a:fontRef>
-        </p:style>
-        <p:txBody>
-          <a:bodyPr rtlCol="0" anchor="ctr"/>
-          <a:lstStyle/>
-          <a:p>
-            <a:pPr algn="ctr"/>
-            <a:r>
-              <a:rPr lang="en-US" dirty="0"/>
-              <a:t>Find My Space</a:t>
-            </a:r>
-          </a:p>
-        </p:txBody>
-      </p:sp>
-      <p:sp>
-        <p:nvSpPr>
-          <p:cNvPr id="2" name="Rectangle 1">
-            <a:extLst>
-              <a:ext uri="{FF2B5EF4-FFF2-40B4-BE49-F238E27FC236}">
-                <a16:creationId xmlns:a16="http://schemas.microsoft.com/office/drawing/2014/main" id="{1626EF4F-619E-4134-A9A0-EFE0B183732F}"/>
-              </a:ext>
-            </a:extLst>
-          </p:cNvPr>
-          <p:cNvSpPr/>
-          <p:nvPr/>
-        </p:nvSpPr>
-        <p:spPr>
-          <a:xfrm>
-            <a:off x="4018280" y="4612640"/>
-            <a:ext cx="4094480" cy="457200"/>
-          </a:xfrm>
-          <a:prstGeom prst="rect">
-            <a:avLst/>
-          </a:prstGeom>
-          <a:noFill/>
-        </p:spPr>
-        <p:style>
-          <a:lnRef idx="2">
-            <a:schemeClr val="accent1">
-              <a:shade val="50000"/>
-            </a:schemeClr>
-          </a:lnRef>
-          <a:fillRef idx="1">
-            <a:schemeClr val="accent1"/>
-          </a:fillRef>
-          <a:effectRef idx="0">
-            <a:schemeClr val="accent1"/>
-          </a:effectRef>
-          <a:fontRef idx="minor">
-            <a:schemeClr val="lt1"/>
-          </a:fontRef>
-        </p:style>
-        <p:txBody>
-          <a:bodyPr rtlCol="0" anchor="ctr"/>
-          <a:lstStyle/>
-          <a:p>
-            <a:pPr algn="ctr"/>
-            <a:endParaRPr lang="en-US"/>
-          </a:p>
-        </p:txBody>
-      </p:sp>
-      <p:sp>
-        <p:nvSpPr>
-          <p:cNvPr id="3" name="TextBox 2">
-            <a:extLst>
-              <a:ext uri="{FF2B5EF4-FFF2-40B4-BE49-F238E27FC236}">
-                <a16:creationId xmlns:a16="http://schemas.microsoft.com/office/drawing/2014/main" id="{2A5C766D-CD29-4E2B-87ED-7A370ECB0CCF}"/>
-              </a:ext>
-            </a:extLst>
-          </p:cNvPr>
-          <p:cNvSpPr txBox="1"/>
-          <p:nvPr/>
-        </p:nvSpPr>
-        <p:spPr>
-          <a:xfrm>
-            <a:off x="1971040" y="4656574"/>
-            <a:ext cx="1991360" cy="369332"/>
-          </a:xfrm>
-          <a:prstGeom prst="rect">
-            <a:avLst/>
-          </a:prstGeom>
-          <a:noFill/>
-        </p:spPr>
-        <p:txBody>
-          <a:bodyPr wrap="square" rtlCol="0">
-            <a:spAutoFit/>
-          </a:bodyPr>
-          <a:lstStyle/>
-          <a:p>
-            <a:pPr algn="r"/>
-            <a:r>
-              <a:rPr lang="en-US" dirty="0"/>
-              <a:t>Location</a:t>
-            </a:r>
-          </a:p>
-        </p:txBody>
-      </p:sp>
-      <p:sp>
-        <p:nvSpPr>
-          <p:cNvPr id="18" name="Rectangle 17">
-            <a:extLst>
-              <a:ext uri="{FF2B5EF4-FFF2-40B4-BE49-F238E27FC236}">
-                <a16:creationId xmlns:a16="http://schemas.microsoft.com/office/drawing/2014/main" id="{57ED407D-B299-4DB4-91F3-3CD7938BC8DB}"/>
-              </a:ext>
-            </a:extLst>
-          </p:cNvPr>
-          <p:cNvSpPr/>
-          <p:nvPr/>
-        </p:nvSpPr>
-        <p:spPr>
-          <a:xfrm>
-            <a:off x="4033520" y="5222240"/>
-            <a:ext cx="4094480" cy="457200"/>
-          </a:xfrm>
-          <a:prstGeom prst="rect">
-            <a:avLst/>
-          </a:prstGeom>
-          <a:noFill/>
-        </p:spPr>
-        <p:style>
-          <a:lnRef idx="2">
-            <a:schemeClr val="accent1">
-              <a:shade val="50000"/>
-            </a:schemeClr>
-          </a:lnRef>
-          <a:fillRef idx="1">
-            <a:schemeClr val="accent1"/>
-          </a:fillRef>
-          <a:effectRef idx="0">
-            <a:schemeClr val="accent1"/>
-          </a:effectRef>
-          <a:fontRef idx="minor">
-            <a:schemeClr val="lt1"/>
-          </a:fontRef>
-        </p:style>
-        <p:txBody>
-          <a:bodyPr rtlCol="0" anchor="ctr"/>
-          <a:lstStyle/>
-          <a:p>
-            <a:pPr algn="ctr"/>
-            <a:endParaRPr lang="en-US"/>
-          </a:p>
-        </p:txBody>
-      </p:sp>
-      <p:sp>
-        <p:nvSpPr>
-          <p:cNvPr id="19" name="TextBox 18">
-            <a:extLst>
-              <a:ext uri="{FF2B5EF4-FFF2-40B4-BE49-F238E27FC236}">
-                <a16:creationId xmlns:a16="http://schemas.microsoft.com/office/drawing/2014/main" id="{86993E04-CB87-4581-841D-06AF20314864}"/>
-              </a:ext>
-            </a:extLst>
-          </p:cNvPr>
-          <p:cNvSpPr txBox="1"/>
-          <p:nvPr/>
-        </p:nvSpPr>
-        <p:spPr>
-          <a:xfrm>
-            <a:off x="1986280" y="5266174"/>
-            <a:ext cx="1991360" cy="369332"/>
-          </a:xfrm>
-          <a:prstGeom prst="rect">
-            <a:avLst/>
-          </a:prstGeom>
-          <a:noFill/>
-        </p:spPr>
-        <p:txBody>
-          <a:bodyPr wrap="square" rtlCol="0">
-            <a:spAutoFit/>
-          </a:bodyPr>
-          <a:lstStyle/>
-          <a:p>
-            <a:pPr algn="r"/>
-            <a:r>
-              <a:rPr lang="en-US" dirty="0"/>
-              <a:t>Location</a:t>
-            </a:r>
-          </a:p>
-        </p:txBody>
-      </p:sp>
-      <p:sp>
-        <p:nvSpPr>
-          <p:cNvPr id="20" name="TextBox 19">
-            <a:extLst>
-              <a:ext uri="{FF2B5EF4-FFF2-40B4-BE49-F238E27FC236}">
-                <a16:creationId xmlns:a16="http://schemas.microsoft.com/office/drawing/2014/main" id="{39D87466-FB96-4AED-815C-3907B2687689}"/>
-              </a:ext>
-            </a:extLst>
-          </p:cNvPr>
-          <p:cNvSpPr txBox="1"/>
-          <p:nvPr/>
-        </p:nvSpPr>
-        <p:spPr>
-          <a:xfrm>
-            <a:off x="3683000" y="652979"/>
-            <a:ext cx="4445000" cy="861774"/>
-          </a:xfrm>
-          <a:prstGeom prst="rect">
-            <a:avLst/>
-          </a:prstGeom>
-          <a:noFill/>
-        </p:spPr>
-        <p:txBody>
-          <a:bodyPr wrap="square" rtlCol="0">
-            <a:spAutoFit/>
-          </a:bodyPr>
-          <a:lstStyle/>
-          <a:p>
-            <a:pPr algn="ctr"/>
-            <a:r>
-              <a:rPr lang="en-US" sz="5000" dirty="0"/>
-              <a:t>Location</a:t>
-            </a:r>
-          </a:p>
-        </p:txBody>
-      </p:sp>
-      <p:sp>
-        <p:nvSpPr>
-          <p:cNvPr id="4" name="Rectangle 3">
-            <a:extLst>
-              <a:ext uri="{FF2B5EF4-FFF2-40B4-BE49-F238E27FC236}">
-                <a16:creationId xmlns:a16="http://schemas.microsoft.com/office/drawing/2014/main" id="{3C31707E-6B24-485B-97E0-A0CAFED2FBB5}"/>
-              </a:ext>
-            </a:extLst>
-          </p:cNvPr>
-          <p:cNvSpPr/>
-          <p:nvPr/>
-        </p:nvSpPr>
-        <p:spPr>
-          <a:xfrm>
-            <a:off x="2600960" y="1859280"/>
-            <a:ext cx="1544320" cy="1066800"/>
-          </a:xfrm>
-          <a:prstGeom prst="rect">
-            <a:avLst/>
-          </a:prstGeom>
-        </p:spPr>
-        <p:style>
-          <a:lnRef idx="2">
-            <a:schemeClr val="accent1">
-              <a:shade val="50000"/>
-            </a:schemeClr>
-          </a:lnRef>
-          <a:fillRef idx="1">
-            <a:schemeClr val="accent1"/>
-          </a:fillRef>
-          <a:effectRef idx="0">
-            <a:schemeClr val="accent1"/>
-          </a:effectRef>
-          <a:fontRef idx="minor">
-            <a:schemeClr val="lt1"/>
-          </a:fontRef>
-        </p:style>
-        <p:txBody>
-          <a:bodyPr rtlCol="0" anchor="ctr"/>
-          <a:lstStyle/>
-          <a:p>
-            <a:pPr algn="ctr"/>
-            <a:endParaRPr lang="en-US"/>
-          </a:p>
-        </p:txBody>
-      </p:sp>
-      <p:sp>
-        <p:nvSpPr>
-          <p:cNvPr id="21" name="Rectangle 20">
-            <a:extLst>
-              <a:ext uri="{FF2B5EF4-FFF2-40B4-BE49-F238E27FC236}">
-                <a16:creationId xmlns:a16="http://schemas.microsoft.com/office/drawing/2014/main" id="{635E40C5-90CD-48DE-A020-B99BDCB3666A}"/>
-              </a:ext>
-            </a:extLst>
-          </p:cNvPr>
-          <p:cNvSpPr/>
-          <p:nvPr/>
-        </p:nvSpPr>
-        <p:spPr>
-          <a:xfrm>
-            <a:off x="5405120" y="2032000"/>
-            <a:ext cx="1544320" cy="1066800"/>
-          </a:xfrm>
-          <a:prstGeom prst="rect">
-            <a:avLst/>
-          </a:prstGeom>
-        </p:spPr>
-        <p:style>
-          <a:lnRef idx="2">
-            <a:schemeClr val="accent1">
-              <a:shade val="50000"/>
-            </a:schemeClr>
-          </a:lnRef>
-          <a:fillRef idx="1">
-            <a:schemeClr val="accent1"/>
-          </a:fillRef>
-          <a:effectRef idx="0">
-            <a:schemeClr val="accent1"/>
-          </a:effectRef>
-          <a:fontRef idx="minor">
-            <a:schemeClr val="lt1"/>
-          </a:fontRef>
-        </p:style>
-        <p:txBody>
-          <a:bodyPr rtlCol="0" anchor="ctr"/>
-          <a:lstStyle/>
-          <a:p>
-            <a:pPr algn="ctr"/>
-            <a:endParaRPr lang="en-US"/>
-          </a:p>
-        </p:txBody>
-      </p:sp>
-      <p:sp>
-        <p:nvSpPr>
-          <p:cNvPr id="22" name="Rectangle 21">
-            <a:extLst>
-              <a:ext uri="{FF2B5EF4-FFF2-40B4-BE49-F238E27FC236}">
-                <a16:creationId xmlns:a16="http://schemas.microsoft.com/office/drawing/2014/main" id="{5DEFFF57-B896-4283-972A-C4A5830F65C0}"/>
-              </a:ext>
-            </a:extLst>
-          </p:cNvPr>
-          <p:cNvSpPr/>
-          <p:nvPr/>
-        </p:nvSpPr>
-        <p:spPr>
-          <a:xfrm>
-            <a:off x="7945120" y="1711960"/>
-            <a:ext cx="1544320" cy="1066800"/>
-          </a:xfrm>
-          <a:prstGeom prst="rect">
-            <a:avLst/>
-          </a:prstGeom>
-        </p:spPr>
-        <p:style>
-          <a:lnRef idx="2">
-            <a:schemeClr val="accent1">
-              <a:shade val="50000"/>
-            </a:schemeClr>
-          </a:lnRef>
-          <a:fillRef idx="1">
-            <a:schemeClr val="accent1"/>
-          </a:fillRef>
-          <a:effectRef idx="0">
-            <a:schemeClr val="accent1"/>
-          </a:effectRef>
-          <a:fontRef idx="minor">
-            <a:schemeClr val="lt1"/>
-          </a:fontRef>
-        </p:style>
-        <p:txBody>
-          <a:bodyPr rtlCol="0" anchor="ctr"/>
-          <a:lstStyle/>
-          <a:p>
-            <a:pPr algn="ctr"/>
-            <a:endParaRPr lang="en-US"/>
-          </a:p>
-        </p:txBody>
-      </p:sp>
-    </p:spTree>
-    <p:extLst>
-      <p:ext uri="{BB962C8B-B14F-4D97-AF65-F5344CB8AC3E}">
-        <p14:creationId xmlns:p14="http://schemas.microsoft.com/office/powerpoint/2010/main" val="3135721834"/>
       </p:ext>
     </p:extLst>
   </p:cSld>

</xml_diff>